<commit_message>
Added seed to data analysis, fixed error in code, uploaded presentation
</commit_message>
<xml_diff>
--- a/presentations/mario_kart_presentation.pptx
+++ b/presentations/mario_kart_presentation.pptx
@@ -8,8 +8,9 @@
     <p:sldId id="256" r:id="rId2"/>
     <p:sldId id="257" r:id="rId3"/>
     <p:sldId id="259" r:id="rId4"/>
-    <p:sldId id="260" r:id="rId5"/>
-    <p:sldId id="261" r:id="rId6"/>
+    <p:sldId id="262" r:id="rId5"/>
+    <p:sldId id="260" r:id="rId6"/>
+    <p:sldId id="261" r:id="rId7"/>
   </p:sldIdLst>
   <p:sldSz cx="12192000" cy="6858000"/>
   <p:notesSz cx="6858000" cy="9144000"/>
@@ -108,6 +109,11 @@
       </a:defRPr>
     </a:lvl9pPr>
   </p:defaultTextStyle>
+  <p:extLst>
+    <p:ext uri="{EFAFB233-063F-42B5-8137-9DF3F51BA10A}">
+      <p15:sldGuideLst xmlns:p15="http://schemas.microsoft.com/office/powerpoint/2012/main"/>
+    </p:ext>
+  </p:extLst>
 </p:presentation>
 </file>
 
@@ -124,7 +130,7 @@
   <pc:docChgLst>
     <pc:chgData name="Emily Black" userId="8f237c0e6c860ff0" providerId="LiveId" clId="{4995A46D-B0FB-48FE-B15D-E12312EFEB61}"/>
     <pc:docChg chg="undo custSel addSld delSld modSld">
-      <pc:chgData name="Emily Black" userId="8f237c0e6c860ff0" providerId="LiveId" clId="{4995A46D-B0FB-48FE-B15D-E12312EFEB61}" dt="2022-09-29T05:09:29.422" v="702" actId="1076"/>
+      <pc:chgData name="Emily Black" userId="8f237c0e6c860ff0" providerId="LiveId" clId="{4995A46D-B0FB-48FE-B15D-E12312EFEB61}" dt="2022-09-29T15:20:17.888" v="713" actId="1076"/>
       <pc:docMkLst>
         <pc:docMk/>
       </pc:docMkLst>
@@ -538,6 +544,85 @@
           </ac:picMkLst>
         </pc:picChg>
       </pc:sldChg>
+      <pc:sldChg chg="addSp delSp modSp add mod">
+        <pc:chgData name="Emily Black" userId="8f237c0e6c860ff0" providerId="LiveId" clId="{4995A46D-B0FB-48FE-B15D-E12312EFEB61}" dt="2022-09-29T15:20:17.888" v="713" actId="1076"/>
+        <pc:sldMkLst>
+          <pc:docMk/>
+          <pc:sldMk cId="2437968476" sldId="262"/>
+        </pc:sldMkLst>
+        <pc:spChg chg="del">
+          <ac:chgData name="Emily Black" userId="8f237c0e6c860ff0" providerId="LiveId" clId="{4995A46D-B0FB-48FE-B15D-E12312EFEB61}" dt="2022-09-29T15:19:43.553" v="704" actId="478"/>
+          <ac:spMkLst>
+            <pc:docMk/>
+            <pc:sldMk cId="2437968476" sldId="262"/>
+            <ac:spMk id="4" creationId="{46C180AA-364C-2136-75DB-4E6B50733903}"/>
+          </ac:spMkLst>
+        </pc:spChg>
+        <pc:spChg chg="del">
+          <ac:chgData name="Emily Black" userId="8f237c0e6c860ff0" providerId="LiveId" clId="{4995A46D-B0FB-48FE-B15D-E12312EFEB61}" dt="2022-09-29T15:19:43.553" v="704" actId="478"/>
+          <ac:spMkLst>
+            <pc:docMk/>
+            <pc:sldMk cId="2437968476" sldId="262"/>
+            <ac:spMk id="9" creationId="{2D99B308-6F97-F470-5E8C-21C39F3BF2DE}"/>
+          </ac:spMkLst>
+        </pc:spChg>
+        <pc:spChg chg="del">
+          <ac:chgData name="Emily Black" userId="8f237c0e6c860ff0" providerId="LiveId" clId="{4995A46D-B0FB-48FE-B15D-E12312EFEB61}" dt="2022-09-29T15:19:43.553" v="704" actId="478"/>
+          <ac:spMkLst>
+            <pc:docMk/>
+            <pc:sldMk cId="2437968476" sldId="262"/>
+            <ac:spMk id="10" creationId="{A6BA89A1-A960-7E9F-AD14-A9A50DC904AE}"/>
+          </ac:spMkLst>
+        </pc:spChg>
+        <pc:spChg chg="del">
+          <ac:chgData name="Emily Black" userId="8f237c0e6c860ff0" providerId="LiveId" clId="{4995A46D-B0FB-48FE-B15D-E12312EFEB61}" dt="2022-09-29T15:19:43.553" v="704" actId="478"/>
+          <ac:spMkLst>
+            <pc:docMk/>
+            <pc:sldMk cId="2437968476" sldId="262"/>
+            <ac:spMk id="11" creationId="{2D29A848-0B59-F615-8DD2-943EDADF8E34}"/>
+          </ac:spMkLst>
+        </pc:spChg>
+        <pc:picChg chg="add mod">
+          <ac:chgData name="Emily Black" userId="8f237c0e6c860ff0" providerId="LiveId" clId="{4995A46D-B0FB-48FE-B15D-E12312EFEB61}" dt="2022-09-29T15:20:17.888" v="713" actId="1076"/>
+          <ac:picMkLst>
+            <pc:docMk/>
+            <pc:sldMk cId="2437968476" sldId="262"/>
+            <ac:picMk id="5" creationId="{C08865F6-462A-11F2-32E0-92581963572C}"/>
+          </ac:picMkLst>
+        </pc:picChg>
+        <pc:picChg chg="add mod">
+          <ac:chgData name="Emily Black" userId="8f237c0e6c860ff0" providerId="LiveId" clId="{4995A46D-B0FB-48FE-B15D-E12312EFEB61}" dt="2022-09-29T15:20:13.126" v="710" actId="1076"/>
+          <ac:picMkLst>
+            <pc:docMk/>
+            <pc:sldMk cId="2437968476" sldId="262"/>
+            <ac:picMk id="7" creationId="{761A5E04-3DAD-8661-5E21-6B08BE9CFA5E}"/>
+          </ac:picMkLst>
+        </pc:picChg>
+        <pc:cxnChg chg="del mod">
+          <ac:chgData name="Emily Black" userId="8f237c0e6c860ff0" providerId="LiveId" clId="{4995A46D-B0FB-48FE-B15D-E12312EFEB61}" dt="2022-09-29T15:19:43.553" v="704" actId="478"/>
+          <ac:cxnSpMkLst>
+            <pc:docMk/>
+            <pc:sldMk cId="2437968476" sldId="262"/>
+            <ac:cxnSpMk id="13" creationId="{39CB7C69-BD5B-84B2-063F-707E3216D648}"/>
+          </ac:cxnSpMkLst>
+        </pc:cxnChg>
+        <pc:cxnChg chg="del">
+          <ac:chgData name="Emily Black" userId="8f237c0e6c860ff0" providerId="LiveId" clId="{4995A46D-B0FB-48FE-B15D-E12312EFEB61}" dt="2022-09-29T15:19:43.553" v="704" actId="478"/>
+          <ac:cxnSpMkLst>
+            <pc:docMk/>
+            <pc:sldMk cId="2437968476" sldId="262"/>
+            <ac:cxnSpMk id="14" creationId="{3AAB969A-C80B-3229-84A9-F8049415B843}"/>
+          </ac:cxnSpMkLst>
+        </pc:cxnChg>
+        <pc:cxnChg chg="del">
+          <ac:chgData name="Emily Black" userId="8f237c0e6c860ff0" providerId="LiveId" clId="{4995A46D-B0FB-48FE-B15D-E12312EFEB61}" dt="2022-09-29T15:19:43.553" v="704" actId="478"/>
+          <ac:cxnSpMkLst>
+            <pc:docMk/>
+            <pc:sldMk cId="2437968476" sldId="262"/>
+            <ac:cxnSpMk id="15" creationId="{B1E7E443-982B-15A1-98A8-EBF0CB21E2B9}"/>
+          </ac:cxnSpMkLst>
+        </pc:cxnChg>
+      </pc:sldChg>
     </pc:docChg>
   </pc:docChgLst>
 </pc:chgInfo>
@@ -4919,6 +5004,128 @@
             <p:ph type="title"/>
           </p:nvPr>
         </p:nvSpPr>
+        <p:spPr/>
+        <p:txBody>
+          <a:bodyPr/>
+          <a:lstStyle/>
+          <a:p>
+            <a:pPr algn="ctr"/>
+            <a:r>
+              <a:rPr lang="en-CA" b="1" dirty="0">
+                <a:latin typeface="Times New Roman" panose="02020603050405020304" pitchFamily="18" charset="0"/>
+                <a:cs typeface="Times New Roman" panose="02020603050405020304" pitchFamily="18" charset="0"/>
+              </a:rPr>
+              <a:t>Problem: how do you win races while also choosing a character you like? </a:t>
+            </a:r>
+          </a:p>
+        </p:txBody>
+      </p:sp>
+      <p:pic>
+        <p:nvPicPr>
+          <p:cNvPr id="5" name="Picture 4">
+            <a:extLst>
+              <a:ext uri="{FF2B5EF4-FFF2-40B4-BE49-F238E27FC236}">
+                <a16:creationId xmlns:a16="http://schemas.microsoft.com/office/drawing/2014/main" id="{C08865F6-462A-11F2-32E0-92581963572C}"/>
+              </a:ext>
+            </a:extLst>
+          </p:cNvPr>
+          <p:cNvPicPr>
+            <a:picLocks noChangeAspect="1"/>
+          </p:cNvPicPr>
+          <p:nvPr/>
+        </p:nvPicPr>
+        <p:blipFill>
+          <a:blip r:embed="rId2"/>
+          <a:stretch>
+            <a:fillRect/>
+          </a:stretch>
+        </p:blipFill>
+        <p:spPr>
+          <a:xfrm>
+            <a:off x="6096000" y="2240624"/>
+            <a:ext cx="5680311" cy="3008580"/>
+          </a:xfrm>
+          <a:prstGeom prst="rect">
+            <a:avLst/>
+          </a:prstGeom>
+        </p:spPr>
+      </p:pic>
+      <p:pic>
+        <p:nvPicPr>
+          <p:cNvPr id="7" name="Picture 6">
+            <a:extLst>
+              <a:ext uri="{FF2B5EF4-FFF2-40B4-BE49-F238E27FC236}">
+                <a16:creationId xmlns:a16="http://schemas.microsoft.com/office/drawing/2014/main" id="{761A5E04-3DAD-8661-5E21-6B08BE9CFA5E}"/>
+              </a:ext>
+            </a:extLst>
+          </p:cNvPr>
+          <p:cNvPicPr>
+            <a:picLocks noChangeAspect="1"/>
+          </p:cNvPicPr>
+          <p:nvPr/>
+        </p:nvPicPr>
+        <p:blipFill>
+          <a:blip r:embed="rId3"/>
+          <a:stretch>
+            <a:fillRect/>
+          </a:stretch>
+        </p:blipFill>
+        <p:spPr>
+          <a:xfrm>
+            <a:off x="990600" y="1909762"/>
+            <a:ext cx="4957762" cy="4173345"/>
+          </a:xfrm>
+          <a:prstGeom prst="rect">
+            <a:avLst/>
+          </a:prstGeom>
+        </p:spPr>
+      </p:pic>
+    </p:spTree>
+    <p:extLst>
+      <p:ext uri="{BB962C8B-B14F-4D97-AF65-F5344CB8AC3E}">
+        <p14:creationId xmlns:p14="http://schemas.microsoft.com/office/powerpoint/2010/main" val="2437968476"/>
+      </p:ext>
+    </p:extLst>
+  </p:cSld>
+  <p:clrMapOvr>
+    <a:masterClrMapping/>
+  </p:clrMapOvr>
+</p:sld>
+</file>
+
+<file path=ppt/slides/slide5.xml><?xml version="1.0" encoding="utf-8"?>
+<p:sld xmlns:a="http://schemas.openxmlformats.org/drawingml/2006/main" xmlns:r="http://schemas.openxmlformats.org/officeDocument/2006/relationships" xmlns:p="http://schemas.openxmlformats.org/presentationml/2006/main">
+  <p:cSld>
+    <p:spTree>
+      <p:nvGrpSpPr>
+        <p:cNvPr id="1" name=""/>
+        <p:cNvGrpSpPr/>
+        <p:nvPr/>
+      </p:nvGrpSpPr>
+      <p:grpSpPr>
+        <a:xfrm>
+          <a:off x="0" y="0"/>
+          <a:ext cx="0" cy="0"/>
+          <a:chOff x="0" y="0"/>
+          <a:chExt cx="0" cy="0"/>
+        </a:xfrm>
+      </p:grpSpPr>
+      <p:sp>
+        <p:nvSpPr>
+          <p:cNvPr id="2" name="Title 1">
+            <a:extLst>
+              <a:ext uri="{FF2B5EF4-FFF2-40B4-BE49-F238E27FC236}">
+                <a16:creationId xmlns:a16="http://schemas.microsoft.com/office/drawing/2014/main" id="{ABCF7736-C943-4B6A-0364-A1BD4D23F0A7}"/>
+              </a:ext>
+            </a:extLst>
+          </p:cNvPr>
+          <p:cNvSpPr>
+            <a:spLocks noGrp="1"/>
+          </p:cNvSpPr>
+          <p:nvPr>
+            <p:ph type="title"/>
+          </p:nvPr>
+        </p:nvSpPr>
         <p:spPr>
           <a:xfrm>
             <a:off x="838200" y="56900"/>
@@ -6405,7 +6612,7 @@
 </p:sld>
 </file>
 
-<file path=ppt/slides/slide5.xml><?xml version="1.0" encoding="utf-8"?>
+<file path=ppt/slides/slide6.xml><?xml version="1.0" encoding="utf-8"?>
 <p:sld xmlns:a="http://schemas.openxmlformats.org/drawingml/2006/main" xmlns:r="http://schemas.openxmlformats.org/officeDocument/2006/relationships" xmlns:p="http://schemas.openxmlformats.org/presentationml/2006/main">
   <p:cSld>
     <p:spTree>

</xml_diff>